<commit_message>
remove cts passed in so the cleanup runs
</commit_message>
<xml_diff>
--- a/2022-03-18-DotNetRome-TheBackgroundOnBackgroundTasksInDotNet6/The Background on Background Tasks.pptx
+++ b/2022-03-18-DotNetRome-TheBackgroundOnBackgroundTasksInDotNet6/The Background on Background Tasks.pptx
@@ -237,7 +237,7 @@
           <a:p>
             <a:fld id="{8EBF47D1-607F-45EE-AE63-C10CF3AC8DD9}" type="datetimeFigureOut">
               <a:rPr lang="en-US" smtClean="0"/>
-              <a:t>3/16/2022</a:t>
+              <a:t>3/17/2022</a:t>
             </a:fld>
             <a:endParaRPr lang="en-US"/>
           </a:p>
@@ -4650,7 +4650,7 @@
           <a:p>
             <a:fld id="{A4BF2526-C75C-47BE-928B-0135A92A66BE}" type="datetimeFigureOut">
               <a:rPr lang="en-US" smtClean="0"/>
-              <a:t>3/16/2022</a:t>
+              <a:t>3/17/2022</a:t>
             </a:fld>
             <a:endParaRPr lang="en-US"/>
           </a:p>
@@ -4848,7 +4848,7 @@
           <a:p>
             <a:fld id="{A4BF2526-C75C-47BE-928B-0135A92A66BE}" type="datetimeFigureOut">
               <a:rPr lang="en-US" smtClean="0"/>
-              <a:t>3/16/2022</a:t>
+              <a:t>3/17/2022</a:t>
             </a:fld>
             <a:endParaRPr lang="en-US"/>
           </a:p>
@@ -5056,7 +5056,7 @@
           <a:p>
             <a:fld id="{A4BF2526-C75C-47BE-928B-0135A92A66BE}" type="datetimeFigureOut">
               <a:rPr lang="en-US" smtClean="0"/>
-              <a:t>3/16/2022</a:t>
+              <a:t>3/17/2022</a:t>
             </a:fld>
             <a:endParaRPr lang="en-US"/>
           </a:p>
@@ -5254,7 +5254,7 @@
           <a:p>
             <a:fld id="{A4BF2526-C75C-47BE-928B-0135A92A66BE}" type="datetimeFigureOut">
               <a:rPr lang="en-US" smtClean="0"/>
-              <a:t>3/16/2022</a:t>
+              <a:t>3/17/2022</a:t>
             </a:fld>
             <a:endParaRPr lang="en-US"/>
           </a:p>
@@ -5529,7 +5529,7 @@
           <a:p>
             <a:fld id="{A4BF2526-C75C-47BE-928B-0135A92A66BE}" type="datetimeFigureOut">
               <a:rPr lang="en-US" smtClean="0"/>
-              <a:t>3/16/2022</a:t>
+              <a:t>3/17/2022</a:t>
             </a:fld>
             <a:endParaRPr lang="en-US"/>
           </a:p>
@@ -5794,7 +5794,7 @@
           <a:p>
             <a:fld id="{A4BF2526-C75C-47BE-928B-0135A92A66BE}" type="datetimeFigureOut">
               <a:rPr lang="en-US" smtClean="0"/>
-              <a:t>3/16/2022</a:t>
+              <a:t>3/17/2022</a:t>
             </a:fld>
             <a:endParaRPr lang="en-US"/>
           </a:p>
@@ -6206,7 +6206,7 @@
           <a:p>
             <a:fld id="{A4BF2526-C75C-47BE-928B-0135A92A66BE}" type="datetimeFigureOut">
               <a:rPr lang="en-US" smtClean="0"/>
-              <a:t>3/16/2022</a:t>
+              <a:t>3/17/2022</a:t>
             </a:fld>
             <a:endParaRPr lang="en-US"/>
           </a:p>
@@ -6347,7 +6347,7 @@
           <a:p>
             <a:fld id="{A4BF2526-C75C-47BE-928B-0135A92A66BE}" type="datetimeFigureOut">
               <a:rPr lang="en-US" smtClean="0"/>
-              <a:t>3/16/2022</a:t>
+              <a:t>3/17/2022</a:t>
             </a:fld>
             <a:endParaRPr lang="en-US"/>
           </a:p>
@@ -6460,7 +6460,7 @@
           <a:p>
             <a:fld id="{A4BF2526-C75C-47BE-928B-0135A92A66BE}" type="datetimeFigureOut">
               <a:rPr lang="en-US" smtClean="0"/>
-              <a:t>3/16/2022</a:t>
+              <a:t>3/17/2022</a:t>
             </a:fld>
             <a:endParaRPr lang="en-US"/>
           </a:p>
@@ -6771,7 +6771,7 @@
           <a:p>
             <a:fld id="{A4BF2526-C75C-47BE-928B-0135A92A66BE}" type="datetimeFigureOut">
               <a:rPr lang="en-US" smtClean="0"/>
-              <a:t>3/16/2022</a:t>
+              <a:t>3/17/2022</a:t>
             </a:fld>
             <a:endParaRPr lang="en-US"/>
           </a:p>
@@ -7059,7 +7059,7 @@
           <a:p>
             <a:fld id="{A4BF2526-C75C-47BE-928B-0135A92A66BE}" type="datetimeFigureOut">
               <a:rPr lang="en-US" smtClean="0"/>
-              <a:t>3/16/2022</a:t>
+              <a:t>3/17/2022</a:t>
             </a:fld>
             <a:endParaRPr lang="en-US"/>
           </a:p>
@@ -7300,7 +7300,7 @@
           <a:p>
             <a:fld id="{A4BF2526-C75C-47BE-928B-0135A92A66BE}" type="datetimeFigureOut">
               <a:rPr lang="en-US" smtClean="0"/>
-              <a:t>3/16/2022</a:t>
+              <a:t>3/17/2022</a:t>
             </a:fld>
             <a:endParaRPr lang="en-US"/>
           </a:p>
@@ -17750,20 +17750,23 @@
           <a:p>
             <a:r>
               <a:rPr lang="en-US" dirty="0"/>
-              <a:t>Enhanced .NET Core Console App template</a:t>
+              <a:t>Enhanced .</a:t>
+            </a:r>
+            <a:r>
+              <a:rPr lang="en-US"/>
+              <a:t>NET Console </a:t>
+            </a:r>
+            <a:r>
+              <a:rPr lang="en-US" dirty="0"/>
+              <a:t>App template</a:t>
             </a:r>
           </a:p>
           <a:p>
             <a:pPr lvl="1"/>
             <a:r>
               <a:rPr lang="en-US" dirty="0"/>
-              <a:t>dotnet new worker –</a:t>
-            </a:r>
-            <a:r>
-              <a:rPr lang="en-US"/>
-              <a:t>o my-custom-worker</a:t>
-            </a:r>
-            <a:endParaRPr lang="en-US" dirty="0"/>
+              <a:t>dotnet new worker –o my-custom-worker</a:t>
+            </a:r>
           </a:p>
           <a:p>
             <a:r>

</xml_diff>

<commit_message>
final ppt and pdf touches
</commit_message>
<xml_diff>
--- a/2022-03-18-DotNetRome-TheBackgroundOnBackgroundTasksInDotNet6/The Background on Background Tasks.pptx
+++ b/2022-03-18-DotNetRome-TheBackgroundOnBackgroundTasksInDotNet6/The Background on Background Tasks.pptx
@@ -17750,15 +17750,7 @@
           <a:p>
             <a:r>
               <a:rPr lang="en-US" dirty="0"/>
-              <a:t>Enhanced .</a:t>
-            </a:r>
-            <a:r>
-              <a:rPr lang="en-US"/>
-              <a:t>NET Console </a:t>
-            </a:r>
-            <a:r>
-              <a:rPr lang="en-US" dirty="0"/>
-              <a:t>App template</a:t>
+              <a:t>Enhanced .NET Console App template</a:t>
             </a:r>
           </a:p>
           <a:p>
@@ -19460,10 +19452,10 @@
       </p:grpSp>
       <p:pic>
         <p:nvPicPr>
-          <p:cNvPr id="12" name="Picture 11">
+          <p:cNvPr id="5" name="Picture 4">
             <a:extLst>
               <a:ext uri="{FF2B5EF4-FFF2-40B4-BE49-F238E27FC236}">
-                <a16:creationId xmlns:a16="http://schemas.microsoft.com/office/drawing/2014/main" id="{2698C95C-CF38-48AF-B7F4-85655B5DA914}"/>
+                <a16:creationId xmlns:a16="http://schemas.microsoft.com/office/drawing/2014/main" id="{18ECF667-1C7B-4D38-A718-6CF283E93F77}"/>
               </a:ext>
             </a:extLst>
           </p:cNvPr>
@@ -19480,8 +19472,8 @@
         </p:blipFill>
         <p:spPr>
           <a:xfrm>
-            <a:off x="1627171" y="3328267"/>
-            <a:ext cx="7466667" cy="2857143"/>
+            <a:off x="1712067" y="2866469"/>
+            <a:ext cx="7961868" cy="3693261"/>
           </a:xfrm>
           <a:prstGeom prst="rect">
             <a:avLst/>

</xml_diff>